<commit_message>
new post : installer R et RStudio
</commit_message>
<xml_diff>
--- a/figures.pptx
+++ b/figures.pptx
@@ -5,9 +5,10 @@
     <p:sldMasterId id="2147483648" r:id="rId1"/>
   </p:sldMasterIdLst>
   <p:sldIdLst>
-    <p:sldId id="256" r:id="rId2"/>
-    <p:sldId id="257" r:id="rId3"/>
-    <p:sldId id="258" r:id="rId4"/>
+    <p:sldId id="259" r:id="rId2"/>
+    <p:sldId id="256" r:id="rId3"/>
+    <p:sldId id="257" r:id="rId4"/>
+    <p:sldId id="258" r:id="rId5"/>
   </p:sldIdLst>
   <p:sldSz cx="12192000" cy="6858000"/>
   <p:notesSz cx="6858000" cy="9144000"/>
@@ -3328,66 +3329,12 @@
           <a:chExt cx="0" cy="0"/>
         </a:xfrm>
       </p:grpSpPr>
-      <p:sp>
-        <p:nvSpPr>
-          <p:cNvPr id="5" name="Rectangle 4">
-            <a:extLst>
-              <a:ext uri="{FF2B5EF4-FFF2-40B4-BE49-F238E27FC236}">
-                <a16:creationId xmlns:a16="http://schemas.microsoft.com/office/drawing/2014/main" id="{40F55FB4-3F2D-4D16-B90D-65F3041EF2C7}"/>
-              </a:ext>
-            </a:extLst>
-          </p:cNvPr>
-          <p:cNvSpPr/>
-          <p:nvPr/>
-        </p:nvSpPr>
-        <p:spPr>
-          <a:xfrm>
-            <a:off x="3507968" y="5058000"/>
-            <a:ext cx="5400000" cy="1800000"/>
-          </a:xfrm>
-          <a:prstGeom prst="rect">
-            <a:avLst/>
-          </a:prstGeom>
-          <a:solidFill>
-            <a:schemeClr val="bg1">
-              <a:alpha val="65000"/>
-            </a:schemeClr>
-          </a:solidFill>
-          <a:ln>
-            <a:noFill/>
-          </a:ln>
-        </p:spPr>
-        <p:style>
-          <a:lnRef idx="2">
-            <a:schemeClr val="accent1">
-              <a:shade val="50000"/>
-            </a:schemeClr>
-          </a:lnRef>
-          <a:fillRef idx="1">
-            <a:schemeClr val="accent1"/>
-          </a:fillRef>
-          <a:effectRef idx="0">
-            <a:schemeClr val="accent1"/>
-          </a:effectRef>
-          <a:fontRef idx="minor">
-            <a:schemeClr val="lt1"/>
-          </a:fontRef>
-        </p:style>
-        <p:txBody>
-          <a:bodyPr rtlCol="0" anchor="ctr"/>
-          <a:lstStyle/>
-          <a:p>
-            <a:pPr algn="ctr"/>
-            <a:endParaRPr lang="fr-FR"/>
-          </a:p>
-        </p:txBody>
-      </p:sp>
       <p:grpSp>
         <p:nvGrpSpPr>
-          <p:cNvPr id="10" name="Groupe 9">
-            <a:extLst>
-              <a:ext uri="{FF2B5EF4-FFF2-40B4-BE49-F238E27FC236}">
-                <a16:creationId xmlns:a16="http://schemas.microsoft.com/office/drawing/2014/main" id="{D880FACE-8DB2-4D8D-B927-6CCD6C0D56CF}"/>
+          <p:cNvPr id="6" name="Groupe 5">
+            <a:extLst>
+              <a:ext uri="{FF2B5EF4-FFF2-40B4-BE49-F238E27FC236}">
+                <a16:creationId xmlns:a16="http://schemas.microsoft.com/office/drawing/2014/main" id="{C2B7031E-6C5F-40EF-9D85-2578B884C66F}"/>
               </a:ext>
             </a:extLst>
           </p:cNvPr>
@@ -3396,7 +3343,7 @@
         </p:nvGrpSpPr>
         <p:grpSpPr>
           <a:xfrm>
-            <a:off x="2286000" y="2711783"/>
+            <a:off x="1536659" y="4861249"/>
             <a:ext cx="6720000" cy="1262842"/>
             <a:chOff x="2286000" y="2711783"/>
             <a:chExt cx="6720000" cy="1262842"/>
@@ -3404,10 +3351,10 @@
         </p:grpSpPr>
         <p:graphicFrame>
           <p:nvGraphicFramePr>
-            <p:cNvPr id="9" name="Objet 8">
+            <p:cNvPr id="7" name="Objet 6">
               <a:extLst>
                 <a:ext uri="{FF2B5EF4-FFF2-40B4-BE49-F238E27FC236}">
-                  <a16:creationId xmlns:a16="http://schemas.microsoft.com/office/drawing/2014/main" id="{D357C9A7-282D-4893-BF18-A1AF909A0F07}"/>
+                  <a16:creationId xmlns:a16="http://schemas.microsoft.com/office/drawing/2014/main" id="{1089E659-F87A-4C4E-99E5-9C9071706967}"/>
                 </a:ext>
               </a:extLst>
             </p:cNvPr>
@@ -3417,7 +3364,7 @@
             <p:nvPr>
               <p:extLst>
                 <p:ext uri="{D42A27DB-BD31-4B8C-83A1-F6EECF244321}">
-                  <p14:modId xmlns:p14="http://schemas.microsoft.com/office/powerpoint/2010/main" val="3435725714"/>
+                  <p14:modId xmlns:p14="http://schemas.microsoft.com/office/powerpoint/2010/main" val="3437467225"/>
                 </p:ext>
               </p:extLst>
             </p:nvPr>
@@ -3430,7 +3377,7 @@
             <a:graphicData uri="http://schemas.openxmlformats.org/presentationml/2006/ole">
               <mc:AlternateContent xmlns:mc="http://schemas.openxmlformats.org/markup-compatibility/2006">
                 <mc:Choice xmlns:v="urn:schemas-microsoft-com:vml" Requires="v">
-                  <p:oleObj spid="_x0000_s1030" name="Bitmap Image" r:id="rId3" imgW="7620120" imgH="1428840" progId="PBrush">
+                  <p:oleObj spid="_x0000_s2054" name="Bitmap Image" r:id="rId3" imgW="7620120" imgH="1428840" progId="PBrush">
                     <p:embed/>
                   </p:oleObj>
                 </mc:Choice>
@@ -3439,7 +3386,13 @@
                     <p:embed/>
                     <p:pic>
                       <p:nvPicPr>
-                        <p:cNvPr id="0" name=""/>
+                        <p:cNvPr id="9" name="Objet 8">
+                          <a:extLst>
+                            <a:ext uri="{FF2B5EF4-FFF2-40B4-BE49-F238E27FC236}">
+                              <a16:creationId xmlns:a16="http://schemas.microsoft.com/office/drawing/2014/main" id="{D357C9A7-282D-4893-BF18-A1AF909A0F07}"/>
+                            </a:ext>
+                          </a:extLst>
+                        </p:cNvPr>
                         <p:cNvPicPr/>
                         <p:nvPr/>
                       </p:nvPicPr>
@@ -3467,10 +3420,10 @@
         </p:graphicFrame>
         <p:sp>
           <p:nvSpPr>
-            <p:cNvPr id="6" name="ZoneTexte 5">
+            <p:cNvPr id="8" name="ZoneTexte 7">
               <a:extLst>
                 <a:ext uri="{FF2B5EF4-FFF2-40B4-BE49-F238E27FC236}">
-                  <a16:creationId xmlns:a16="http://schemas.microsoft.com/office/drawing/2014/main" id="{DCFBB140-C239-4AA5-BACE-E192BA893089}"/>
+                  <a16:creationId xmlns:a16="http://schemas.microsoft.com/office/drawing/2014/main" id="{2B9AE921-E5AD-403E-BB38-C6FE6943D046}"/>
                 </a:ext>
               </a:extLst>
             </p:cNvPr>
@@ -3525,6 +3478,263 @@
           </p:txBody>
         </p:sp>
       </p:grpSp>
+      <p:grpSp>
+        <p:nvGrpSpPr>
+          <p:cNvPr id="24" name="Groupe 23">
+            <a:extLst>
+              <a:ext uri="{FF2B5EF4-FFF2-40B4-BE49-F238E27FC236}">
+                <a16:creationId xmlns:a16="http://schemas.microsoft.com/office/drawing/2014/main" id="{2F9F9B5B-D98E-4D7C-BA2E-0FB0F41FF760}"/>
+              </a:ext>
+            </a:extLst>
+          </p:cNvPr>
+          <p:cNvGrpSpPr/>
+          <p:nvPr/>
+        </p:nvGrpSpPr>
+        <p:grpSpPr>
+          <a:xfrm>
+            <a:off x="1250075" y="1363909"/>
+            <a:ext cx="9000000" cy="1260000"/>
+            <a:chOff x="979488" y="2194249"/>
+            <a:chExt cx="9000000" cy="1260000"/>
+          </a:xfrm>
+        </p:grpSpPr>
+        <p:graphicFrame>
+          <p:nvGraphicFramePr>
+            <p:cNvPr id="22" name="Objet 21">
+              <a:extLst>
+                <a:ext uri="{FF2B5EF4-FFF2-40B4-BE49-F238E27FC236}">
+                  <a16:creationId xmlns:a16="http://schemas.microsoft.com/office/drawing/2014/main" id="{66EDB869-9EAE-4A97-8040-7794905E566C}"/>
+                </a:ext>
+              </a:extLst>
+            </p:cNvPr>
+            <p:cNvGraphicFramePr>
+              <a:graphicFrameLocks/>
+            </p:cNvGraphicFramePr>
+            <p:nvPr>
+              <p:extLst>
+                <p:ext uri="{D42A27DB-BD31-4B8C-83A1-F6EECF244321}">
+                  <p14:modId xmlns:p14="http://schemas.microsoft.com/office/powerpoint/2010/main" val="3570470120"/>
+                </p:ext>
+              </p:extLst>
+            </p:nvPr>
+          </p:nvGraphicFramePr>
+          <p:xfrm>
+            <a:off x="979488" y="2194249"/>
+            <a:ext cx="9000000" cy="1260000"/>
+          </p:xfrm>
+          <a:graphic>
+            <a:graphicData uri="http://schemas.openxmlformats.org/presentationml/2006/ole">
+              <mc:AlternateContent xmlns:mc="http://schemas.openxmlformats.org/markup-compatibility/2006">
+                <mc:Choice xmlns:v="urn:schemas-microsoft-com:vml" Requires="v">
+                  <p:oleObj spid="_x0000_s2055" name="Bitmap Image" r:id="rId5" imgW="8744040" imgH="1295280" progId="PBrush">
+                    <p:embed/>
+                  </p:oleObj>
+                </mc:Choice>
+                <mc:Fallback>
+                  <p:oleObj name="Bitmap Image" r:id="rId5" imgW="8744040" imgH="1295280" progId="PBrush">
+                    <p:embed/>
+                    <p:pic>
+                      <p:nvPicPr>
+                        <p:cNvPr id="0" name=""/>
+                        <p:cNvPicPr/>
+                        <p:nvPr/>
+                      </p:nvPicPr>
+                      <p:blipFill>
+                        <a:blip r:embed="rId6"/>
+                        <a:stretch>
+                          <a:fillRect/>
+                        </a:stretch>
+                      </p:blipFill>
+                      <p:spPr>
+                        <a:xfrm>
+                          <a:off x="979488" y="2194249"/>
+                          <a:ext cx="9000000" cy="1260000"/>
+                        </a:xfrm>
+                        <a:prstGeom prst="rect">
+                          <a:avLst/>
+                        </a:prstGeom>
+                      </p:spPr>
+                    </p:pic>
+                  </p:oleObj>
+                </mc:Fallback>
+              </mc:AlternateContent>
+            </a:graphicData>
+          </a:graphic>
+        </p:graphicFrame>
+        <p:sp>
+          <p:nvSpPr>
+            <p:cNvPr id="23" name="ZoneTexte 22">
+              <a:extLst>
+                <a:ext uri="{FF2B5EF4-FFF2-40B4-BE49-F238E27FC236}">
+                  <a16:creationId xmlns:a16="http://schemas.microsoft.com/office/drawing/2014/main" id="{1724D20F-5860-4451-AB87-C10B9FE2B617}"/>
+                </a:ext>
+              </a:extLst>
+            </p:cNvPr>
+            <p:cNvSpPr txBox="1"/>
+            <p:nvPr/>
+          </p:nvSpPr>
+          <p:spPr>
+            <a:xfrm>
+              <a:off x="979488" y="2194249"/>
+              <a:ext cx="9000000" cy="1260000"/>
+            </a:xfrm>
+            <a:prstGeom prst="rect">
+              <a:avLst/>
+            </a:prstGeom>
+            <a:solidFill>
+              <a:schemeClr val="bg1">
+                <a:alpha val="50000"/>
+              </a:schemeClr>
+            </a:solidFill>
+          </p:spPr>
+          <p:txBody>
+            <a:bodyPr wrap="square" rtlCol="0" anchor="ctr">
+              <a:spAutoFit/>
+            </a:bodyPr>
+            <a:lstStyle/>
+            <a:p>
+              <a:pPr algn="ctr"/>
+              <a:r>
+                <a:rPr lang="fr-FR" sz="4000" b="1" dirty="0">
+                  <a:ln w="38100">
+                    <a:solidFill>
+                      <a:schemeClr val="tx1"/>
+                    </a:solidFill>
+                  </a:ln>
+                  <a:solidFill>
+                    <a:schemeClr val="bg1"/>
+                  </a:solidFill>
+                  <a:effectLst>
+                    <a:outerShdw blurRad="38100" dist="38100" dir="2700000" algn="tl">
+                      <a:srgbClr val="000000">
+                        <a:alpha val="43137"/>
+                      </a:srgbClr>
+                    </a:outerShdw>
+                  </a:effectLst>
+                  <a:latin typeface="Segoe UI Black" panose="020B0A02040204020203" pitchFamily="34" charset="0"/>
+                  <a:ea typeface="Segoe UI Black" panose="020B0A02040204020203" pitchFamily="34" charset="0"/>
+                  <a:cs typeface="Segoe UI Light" panose="020B0502040204020203" pitchFamily="34" charset="0"/>
+                </a:rPr>
+                <a:t>INSTALLER R ET RSTUDIO</a:t>
+              </a:r>
+            </a:p>
+          </p:txBody>
+        </p:sp>
+      </p:grpSp>
+    </p:spTree>
+    <p:extLst>
+      <p:ext uri="{BB962C8B-B14F-4D97-AF65-F5344CB8AC3E}">
+        <p14:creationId xmlns:p14="http://schemas.microsoft.com/office/powerpoint/2010/main" val="1577454238"/>
+      </p:ext>
+    </p:extLst>
+  </p:cSld>
+  <p:clrMapOvr>
+    <a:masterClrMapping/>
+  </p:clrMapOvr>
+</p:sld>
+</file>
+
+<file path=ppt/slides/slide2.xml><?xml version="1.0" encoding="utf-8"?>
+<p:sld xmlns:a="http://schemas.openxmlformats.org/drawingml/2006/main" xmlns:r="http://schemas.openxmlformats.org/officeDocument/2006/relationships" xmlns:p="http://schemas.openxmlformats.org/presentationml/2006/main">
+  <p:cSld>
+    <p:spTree>
+      <p:nvGrpSpPr>
+        <p:cNvPr id="1" name=""/>
+        <p:cNvGrpSpPr/>
+        <p:nvPr/>
+      </p:nvGrpSpPr>
+      <p:grpSpPr>
+        <a:xfrm>
+          <a:off x="0" y="0"/>
+          <a:ext cx="0" cy="0"/>
+          <a:chOff x="0" y="0"/>
+          <a:chExt cx="0" cy="0"/>
+        </a:xfrm>
+      </p:grpSpPr>
+      <p:sp>
+        <p:nvSpPr>
+          <p:cNvPr id="5" name="Rectangle 4">
+            <a:extLst>
+              <a:ext uri="{FF2B5EF4-FFF2-40B4-BE49-F238E27FC236}">
+                <a16:creationId xmlns:a16="http://schemas.microsoft.com/office/drawing/2014/main" id="{40F55FB4-3F2D-4D16-B90D-65F3041EF2C7}"/>
+              </a:ext>
+            </a:extLst>
+          </p:cNvPr>
+          <p:cNvSpPr/>
+          <p:nvPr/>
+        </p:nvSpPr>
+        <p:spPr>
+          <a:xfrm>
+            <a:off x="3507968" y="5058000"/>
+            <a:ext cx="5400000" cy="1800000"/>
+          </a:xfrm>
+          <a:prstGeom prst="rect">
+            <a:avLst/>
+          </a:prstGeom>
+          <a:solidFill>
+            <a:schemeClr val="bg1">
+              <a:alpha val="65000"/>
+            </a:schemeClr>
+          </a:solidFill>
+          <a:ln>
+            <a:noFill/>
+          </a:ln>
+        </p:spPr>
+        <p:style>
+          <a:lnRef idx="2">
+            <a:schemeClr val="accent1">
+              <a:shade val="50000"/>
+            </a:schemeClr>
+          </a:lnRef>
+          <a:fillRef idx="1">
+            <a:schemeClr val="accent1"/>
+          </a:fillRef>
+          <a:effectRef idx="0">
+            <a:schemeClr val="accent1"/>
+          </a:effectRef>
+          <a:fontRef idx="minor">
+            <a:schemeClr val="lt1"/>
+          </a:fontRef>
+        </p:style>
+        <p:txBody>
+          <a:bodyPr rtlCol="0" anchor="ctr"/>
+          <a:lstStyle/>
+          <a:p>
+            <a:pPr algn="ctr"/>
+            <a:endParaRPr lang="fr-FR"/>
+          </a:p>
+        </p:txBody>
+      </p:sp>
+      <p:pic>
+        <p:nvPicPr>
+          <p:cNvPr id="3" name="Image 2">
+            <a:extLst>
+              <a:ext uri="{FF2B5EF4-FFF2-40B4-BE49-F238E27FC236}">
+                <a16:creationId xmlns:a16="http://schemas.microsoft.com/office/drawing/2014/main" id="{1DCFAE27-9C6A-4E55-B034-21EF316E2B3B}"/>
+              </a:ext>
+            </a:extLst>
+          </p:cNvPr>
+          <p:cNvPicPr>
+            <a:picLocks noChangeAspect="1"/>
+          </p:cNvPicPr>
+          <p:nvPr/>
+        </p:nvPicPr>
+        <p:blipFill>
+          <a:blip r:embed="rId2"/>
+          <a:stretch>
+            <a:fillRect/>
+          </a:stretch>
+        </p:blipFill>
+        <p:spPr>
+          <a:xfrm>
+            <a:off x="1478574" y="2173115"/>
+            <a:ext cx="8998476" cy="1255885"/>
+          </a:xfrm>
+          <a:prstGeom prst="rect">
+            <a:avLst/>
+          </a:prstGeom>
+        </p:spPr>
+      </p:pic>
     </p:spTree>
     <p:extLst>
       <p:ext uri="{BB962C8B-B14F-4D97-AF65-F5344CB8AC3E}">
@@ -3538,7 +3748,7 @@
 </p:sld>
 </file>
 
-<file path=ppt/slides/slide2.xml><?xml version="1.0" encoding="utf-8"?>
+<file path=ppt/slides/slide3.xml><?xml version="1.0" encoding="utf-8"?>
 <p:sld xmlns:a="http://schemas.openxmlformats.org/drawingml/2006/main" xmlns:r="http://schemas.openxmlformats.org/officeDocument/2006/relationships" xmlns:p="http://schemas.openxmlformats.org/presentationml/2006/main">
   <p:cSld>
     <p:spTree>
@@ -3785,7 +3995,7 @@
 </p:sld>
 </file>
 
-<file path=ppt/slides/slide3.xml><?xml version="1.0" encoding="utf-8"?>
+<file path=ppt/slides/slide4.xml><?xml version="1.0" encoding="utf-8"?>
 <p:sld xmlns:a="http://schemas.openxmlformats.org/drawingml/2006/main" xmlns:r="http://schemas.openxmlformats.org/officeDocument/2006/relationships" xmlns:p="http://schemas.openxmlformats.org/presentationml/2006/main">
   <p:cSld>
     <p:spTree>

</xml_diff>